<commit_message>
feat(templates): ✨ add new PowerPoint template with title
* Introduced `PowerPointWithTitle.pptx` to enhance presentation options.
* Updated existing `PowerPointBlank.pptx` template.
</commit_message>
<xml_diff>
--- a/Assets/PowerPointTemplates/PowerPointBlank.pptx
+++ b/Assets/PowerPointTemplates/PowerPointBlank.pptx
@@ -129,7 +129,7 @@
           <p:cNvPr id="2" name="Title 1">
             <a:extLst>
               <a:ext uri="{FF2B5EF4-FFF2-40B4-BE49-F238E27FC236}">
-                <a16:creationId xmlns:a16="http://schemas.microsoft.com/office/drawing/2014/main" id="{EA59BA93-AA35-B1EA-8DF0-FEC2A721E9F5}"/>
+                <a16:creationId xmlns:a16="http://schemas.microsoft.com/office/drawing/2014/main" id="{8B34C2AD-2B89-D91D-BFF9-62C33D9EF755}"/>
               </a:ext>
             </a:extLst>
           </p:cNvPr>
@@ -167,7 +167,7 @@
           <p:cNvPr id="3" name="Subtitle 2">
             <a:extLst>
               <a:ext uri="{FF2B5EF4-FFF2-40B4-BE49-F238E27FC236}">
-                <a16:creationId xmlns:a16="http://schemas.microsoft.com/office/drawing/2014/main" id="{997FBBC3-0B91-87DC-6A9E-E136C996E011}"/>
+                <a16:creationId xmlns:a16="http://schemas.microsoft.com/office/drawing/2014/main" id="{82BF5914-4F8A-3ECA-543E-205F42B78D5A}"/>
               </a:ext>
             </a:extLst>
           </p:cNvPr>
@@ -238,7 +238,7 @@
           <p:cNvPr id="4" name="Date Placeholder 3">
             <a:extLst>
               <a:ext uri="{FF2B5EF4-FFF2-40B4-BE49-F238E27FC236}">
-                <a16:creationId xmlns:a16="http://schemas.microsoft.com/office/drawing/2014/main" id="{D6055490-6572-3B05-9437-C2D42337C638}"/>
+                <a16:creationId xmlns:a16="http://schemas.microsoft.com/office/drawing/2014/main" id="{8A3AC2FF-2F37-46B6-1EED-FA6325F80CF1}"/>
               </a:ext>
             </a:extLst>
           </p:cNvPr>
@@ -254,7 +254,7 @@
           <a:bodyPr/>
           <a:lstStyle/>
           <a:p>
-            <a:fld id="{CD6DCCC6-BADD-41C4-B4B0-955E0C7C8049}" type="datetimeFigureOut">
+            <a:fld id="{F550F806-175B-4EE1-ABEA-A5F04E4FD72B}" type="datetimeFigureOut">
               <a:rPr lang="pl-PL" smtClean="0"/>
               <a:t>20.08.2025</a:t>
             </a:fld>
@@ -267,7 +267,7 @@
           <p:cNvPr id="5" name="Footer Placeholder 4">
             <a:extLst>
               <a:ext uri="{FF2B5EF4-FFF2-40B4-BE49-F238E27FC236}">
-                <a16:creationId xmlns:a16="http://schemas.microsoft.com/office/drawing/2014/main" id="{DEFC2B82-6B1F-94FC-4B90-3369AC89BBBA}"/>
+                <a16:creationId xmlns:a16="http://schemas.microsoft.com/office/drawing/2014/main" id="{42488568-0327-012F-AFE1-5B034F8E109B}"/>
               </a:ext>
             </a:extLst>
           </p:cNvPr>
@@ -292,7 +292,7 @@
           <p:cNvPr id="6" name="Slide Number Placeholder 5">
             <a:extLst>
               <a:ext uri="{FF2B5EF4-FFF2-40B4-BE49-F238E27FC236}">
-                <a16:creationId xmlns:a16="http://schemas.microsoft.com/office/drawing/2014/main" id="{5DDB0612-5424-2969-6CD6-18C4A4901940}"/>
+                <a16:creationId xmlns:a16="http://schemas.microsoft.com/office/drawing/2014/main" id="{BD89448F-A6A5-7100-8437-1CE0B3C70555}"/>
               </a:ext>
             </a:extLst>
           </p:cNvPr>
@@ -308,7 +308,7 @@
           <a:bodyPr/>
           <a:lstStyle/>
           <a:p>
-            <a:fld id="{CCBC8787-89D9-48E3-8596-2CADE2E7DDE1}" type="slidenum">
+            <a:fld id="{5FAB34AF-B09A-4E2A-BAD3-CCD6E0AD81E6}" type="slidenum">
               <a:rPr lang="pl-PL" smtClean="0"/>
               <a:t>‹#›</a:t>
             </a:fld>
@@ -319,7 +319,7 @@
     </p:spTree>
     <p:extLst>
       <p:ext uri="{BB962C8B-B14F-4D97-AF65-F5344CB8AC3E}">
-        <p14:creationId xmlns:p14="http://schemas.microsoft.com/office/powerpoint/2010/main" val="309538286"/>
+        <p14:creationId xmlns:p14="http://schemas.microsoft.com/office/powerpoint/2010/main" val="82025322"/>
       </p:ext>
     </p:extLst>
   </p:cSld>
@@ -351,7 +351,7 @@
           <p:cNvPr id="2" name="Title 1">
             <a:extLst>
               <a:ext uri="{FF2B5EF4-FFF2-40B4-BE49-F238E27FC236}">
-                <a16:creationId xmlns:a16="http://schemas.microsoft.com/office/drawing/2014/main" id="{7D0782BB-7505-8B40-A703-BBC840E6E29F}"/>
+                <a16:creationId xmlns:a16="http://schemas.microsoft.com/office/drawing/2014/main" id="{60577B76-5D41-DF0C-5067-982852358610}"/>
               </a:ext>
             </a:extLst>
           </p:cNvPr>
@@ -380,7 +380,7 @@
           <p:cNvPr id="3" name="Vertical Text Placeholder 2">
             <a:extLst>
               <a:ext uri="{FF2B5EF4-FFF2-40B4-BE49-F238E27FC236}">
-                <a16:creationId xmlns:a16="http://schemas.microsoft.com/office/drawing/2014/main" id="{20DA59DF-C2F0-76ED-5B60-4F449D6E9A72}"/>
+                <a16:creationId xmlns:a16="http://schemas.microsoft.com/office/drawing/2014/main" id="{CB94687B-2111-11BC-7FB0-B651D2E43603}"/>
               </a:ext>
             </a:extLst>
           </p:cNvPr>
@@ -438,7 +438,7 @@
           <p:cNvPr id="4" name="Date Placeholder 3">
             <a:extLst>
               <a:ext uri="{FF2B5EF4-FFF2-40B4-BE49-F238E27FC236}">
-                <a16:creationId xmlns:a16="http://schemas.microsoft.com/office/drawing/2014/main" id="{BB84C299-9A51-FE13-0413-FC86E9E4C1A3}"/>
+                <a16:creationId xmlns:a16="http://schemas.microsoft.com/office/drawing/2014/main" id="{D64F779F-1CA1-3EB0-C3B2-388D36152299}"/>
               </a:ext>
             </a:extLst>
           </p:cNvPr>
@@ -454,7 +454,7 @@
           <a:bodyPr/>
           <a:lstStyle/>
           <a:p>
-            <a:fld id="{CD6DCCC6-BADD-41C4-B4B0-955E0C7C8049}" type="datetimeFigureOut">
+            <a:fld id="{F550F806-175B-4EE1-ABEA-A5F04E4FD72B}" type="datetimeFigureOut">
               <a:rPr lang="pl-PL" smtClean="0"/>
               <a:t>20.08.2025</a:t>
             </a:fld>
@@ -467,7 +467,7 @@
           <p:cNvPr id="5" name="Footer Placeholder 4">
             <a:extLst>
               <a:ext uri="{FF2B5EF4-FFF2-40B4-BE49-F238E27FC236}">
-                <a16:creationId xmlns:a16="http://schemas.microsoft.com/office/drawing/2014/main" id="{AE0C52F7-BBA9-3958-AD6E-6737ED5DD3BC}"/>
+                <a16:creationId xmlns:a16="http://schemas.microsoft.com/office/drawing/2014/main" id="{943C26C4-AA11-A748-56F1-72D504AE6CC2}"/>
               </a:ext>
             </a:extLst>
           </p:cNvPr>
@@ -492,7 +492,7 @@
           <p:cNvPr id="6" name="Slide Number Placeholder 5">
             <a:extLst>
               <a:ext uri="{FF2B5EF4-FFF2-40B4-BE49-F238E27FC236}">
-                <a16:creationId xmlns:a16="http://schemas.microsoft.com/office/drawing/2014/main" id="{EE5CE646-BA07-9F3C-A53C-83B4F4D9491E}"/>
+                <a16:creationId xmlns:a16="http://schemas.microsoft.com/office/drawing/2014/main" id="{0E75C361-56F3-5B56-BECA-E4C4A127A0A5}"/>
               </a:ext>
             </a:extLst>
           </p:cNvPr>
@@ -508,7 +508,7 @@
           <a:bodyPr/>
           <a:lstStyle/>
           <a:p>
-            <a:fld id="{CCBC8787-89D9-48E3-8596-2CADE2E7DDE1}" type="slidenum">
+            <a:fld id="{5FAB34AF-B09A-4E2A-BAD3-CCD6E0AD81E6}" type="slidenum">
               <a:rPr lang="pl-PL" smtClean="0"/>
               <a:t>‹#›</a:t>
             </a:fld>
@@ -519,7 +519,7 @@
     </p:spTree>
     <p:extLst>
       <p:ext uri="{BB962C8B-B14F-4D97-AF65-F5344CB8AC3E}">
-        <p14:creationId xmlns:p14="http://schemas.microsoft.com/office/powerpoint/2010/main" val="1263947794"/>
+        <p14:creationId xmlns:p14="http://schemas.microsoft.com/office/powerpoint/2010/main" val="1153641642"/>
       </p:ext>
     </p:extLst>
   </p:cSld>
@@ -551,7 +551,7 @@
           <p:cNvPr id="2" name="Vertical Title 1">
             <a:extLst>
               <a:ext uri="{FF2B5EF4-FFF2-40B4-BE49-F238E27FC236}">
-                <a16:creationId xmlns:a16="http://schemas.microsoft.com/office/drawing/2014/main" id="{4DE06877-6FA9-07FC-848E-F294ABED7334}"/>
+                <a16:creationId xmlns:a16="http://schemas.microsoft.com/office/drawing/2014/main" id="{CA4FEE10-459B-1FD5-3F1B-98B2BE2CE8CD}"/>
               </a:ext>
             </a:extLst>
           </p:cNvPr>
@@ -585,7 +585,7 @@
           <p:cNvPr id="3" name="Vertical Text Placeholder 2">
             <a:extLst>
               <a:ext uri="{FF2B5EF4-FFF2-40B4-BE49-F238E27FC236}">
-                <a16:creationId xmlns:a16="http://schemas.microsoft.com/office/drawing/2014/main" id="{0851ABD5-2A56-50EC-7E9D-653877974844}"/>
+                <a16:creationId xmlns:a16="http://schemas.microsoft.com/office/drawing/2014/main" id="{8940CB41-24D0-61D1-D945-E91DC24F8D47}"/>
               </a:ext>
             </a:extLst>
           </p:cNvPr>
@@ -648,7 +648,7 @@
           <p:cNvPr id="4" name="Date Placeholder 3">
             <a:extLst>
               <a:ext uri="{FF2B5EF4-FFF2-40B4-BE49-F238E27FC236}">
-                <a16:creationId xmlns:a16="http://schemas.microsoft.com/office/drawing/2014/main" id="{66A6E43E-700C-7C49-630B-1DA2824568F8}"/>
+                <a16:creationId xmlns:a16="http://schemas.microsoft.com/office/drawing/2014/main" id="{E950EA4F-C90A-4241-C074-3EE9EC5D2BC6}"/>
               </a:ext>
             </a:extLst>
           </p:cNvPr>
@@ -664,7 +664,7 @@
           <a:bodyPr/>
           <a:lstStyle/>
           <a:p>
-            <a:fld id="{CD6DCCC6-BADD-41C4-B4B0-955E0C7C8049}" type="datetimeFigureOut">
+            <a:fld id="{F550F806-175B-4EE1-ABEA-A5F04E4FD72B}" type="datetimeFigureOut">
               <a:rPr lang="pl-PL" smtClean="0"/>
               <a:t>20.08.2025</a:t>
             </a:fld>
@@ -677,7 +677,7 @@
           <p:cNvPr id="5" name="Footer Placeholder 4">
             <a:extLst>
               <a:ext uri="{FF2B5EF4-FFF2-40B4-BE49-F238E27FC236}">
-                <a16:creationId xmlns:a16="http://schemas.microsoft.com/office/drawing/2014/main" id="{884036C5-09C1-0052-21CB-92295AE1EE71}"/>
+                <a16:creationId xmlns:a16="http://schemas.microsoft.com/office/drawing/2014/main" id="{1B7E3A5F-0975-F339-E34B-FE6C638870E9}"/>
               </a:ext>
             </a:extLst>
           </p:cNvPr>
@@ -702,7 +702,7 @@
           <p:cNvPr id="6" name="Slide Number Placeholder 5">
             <a:extLst>
               <a:ext uri="{FF2B5EF4-FFF2-40B4-BE49-F238E27FC236}">
-                <a16:creationId xmlns:a16="http://schemas.microsoft.com/office/drawing/2014/main" id="{43F10373-594E-AF3C-5578-FC40008AD14A}"/>
+                <a16:creationId xmlns:a16="http://schemas.microsoft.com/office/drawing/2014/main" id="{C8E04515-967E-1BBE-E3A5-5B32FE5C5226}"/>
               </a:ext>
             </a:extLst>
           </p:cNvPr>
@@ -718,7 +718,7 @@
           <a:bodyPr/>
           <a:lstStyle/>
           <a:p>
-            <a:fld id="{CCBC8787-89D9-48E3-8596-2CADE2E7DDE1}" type="slidenum">
+            <a:fld id="{5FAB34AF-B09A-4E2A-BAD3-CCD6E0AD81E6}" type="slidenum">
               <a:rPr lang="pl-PL" smtClean="0"/>
               <a:t>‹#›</a:t>
             </a:fld>
@@ -729,7 +729,7 @@
     </p:spTree>
     <p:extLst>
       <p:ext uri="{BB962C8B-B14F-4D97-AF65-F5344CB8AC3E}">
-        <p14:creationId xmlns:p14="http://schemas.microsoft.com/office/powerpoint/2010/main" val="4215087174"/>
+        <p14:creationId xmlns:p14="http://schemas.microsoft.com/office/powerpoint/2010/main" val="2514756079"/>
       </p:ext>
     </p:extLst>
   </p:cSld>
@@ -761,7 +761,7 @@
           <p:cNvPr id="2" name="Title 1">
             <a:extLst>
               <a:ext uri="{FF2B5EF4-FFF2-40B4-BE49-F238E27FC236}">
-                <a16:creationId xmlns:a16="http://schemas.microsoft.com/office/drawing/2014/main" id="{929EB9D2-0156-8AA1-0581-33BB88404D19}"/>
+                <a16:creationId xmlns:a16="http://schemas.microsoft.com/office/drawing/2014/main" id="{97C3C552-C929-FA6A-1A07-D563D3C96C31}"/>
               </a:ext>
             </a:extLst>
           </p:cNvPr>
@@ -790,7 +790,7 @@
           <p:cNvPr id="3" name="Content Placeholder 2">
             <a:extLst>
               <a:ext uri="{FF2B5EF4-FFF2-40B4-BE49-F238E27FC236}">
-                <a16:creationId xmlns:a16="http://schemas.microsoft.com/office/drawing/2014/main" id="{CBA396E0-1BE9-29ED-F9AC-DF99726BE8AA}"/>
+                <a16:creationId xmlns:a16="http://schemas.microsoft.com/office/drawing/2014/main" id="{79AD22D5-35D7-F916-60EB-0E484F7F7AEC}"/>
               </a:ext>
             </a:extLst>
           </p:cNvPr>
@@ -848,7 +848,7 @@
           <p:cNvPr id="4" name="Date Placeholder 3">
             <a:extLst>
               <a:ext uri="{FF2B5EF4-FFF2-40B4-BE49-F238E27FC236}">
-                <a16:creationId xmlns:a16="http://schemas.microsoft.com/office/drawing/2014/main" id="{DF13AD31-CA25-4402-88C7-7CD872D0603D}"/>
+                <a16:creationId xmlns:a16="http://schemas.microsoft.com/office/drawing/2014/main" id="{B87665A7-B3FD-88BE-92D6-5884B03B8408}"/>
               </a:ext>
             </a:extLst>
           </p:cNvPr>
@@ -864,7 +864,7 @@
           <a:bodyPr/>
           <a:lstStyle/>
           <a:p>
-            <a:fld id="{CD6DCCC6-BADD-41C4-B4B0-955E0C7C8049}" type="datetimeFigureOut">
+            <a:fld id="{F550F806-175B-4EE1-ABEA-A5F04E4FD72B}" type="datetimeFigureOut">
               <a:rPr lang="pl-PL" smtClean="0"/>
               <a:t>20.08.2025</a:t>
             </a:fld>
@@ -877,7 +877,7 @@
           <p:cNvPr id="5" name="Footer Placeholder 4">
             <a:extLst>
               <a:ext uri="{FF2B5EF4-FFF2-40B4-BE49-F238E27FC236}">
-                <a16:creationId xmlns:a16="http://schemas.microsoft.com/office/drawing/2014/main" id="{AC21C15D-97DC-7E3B-BB33-045424104703}"/>
+                <a16:creationId xmlns:a16="http://schemas.microsoft.com/office/drawing/2014/main" id="{10DB848D-1DBB-F7C5-72D0-DE776AA72E35}"/>
               </a:ext>
             </a:extLst>
           </p:cNvPr>
@@ -902,7 +902,7 @@
           <p:cNvPr id="6" name="Slide Number Placeholder 5">
             <a:extLst>
               <a:ext uri="{FF2B5EF4-FFF2-40B4-BE49-F238E27FC236}">
-                <a16:creationId xmlns:a16="http://schemas.microsoft.com/office/drawing/2014/main" id="{A262E9A4-B30F-EAEB-AC8F-4764F3DD601C}"/>
+                <a16:creationId xmlns:a16="http://schemas.microsoft.com/office/drawing/2014/main" id="{2D85A33A-A0AB-ED74-2677-03175D123739}"/>
               </a:ext>
             </a:extLst>
           </p:cNvPr>
@@ -918,7 +918,7 @@
           <a:bodyPr/>
           <a:lstStyle/>
           <a:p>
-            <a:fld id="{CCBC8787-89D9-48E3-8596-2CADE2E7DDE1}" type="slidenum">
+            <a:fld id="{5FAB34AF-B09A-4E2A-BAD3-CCD6E0AD81E6}" type="slidenum">
               <a:rPr lang="pl-PL" smtClean="0"/>
               <a:t>‹#›</a:t>
             </a:fld>
@@ -929,7 +929,7 @@
     </p:spTree>
     <p:extLst>
       <p:ext uri="{BB962C8B-B14F-4D97-AF65-F5344CB8AC3E}">
-        <p14:creationId xmlns:p14="http://schemas.microsoft.com/office/powerpoint/2010/main" val="2138866213"/>
+        <p14:creationId xmlns:p14="http://schemas.microsoft.com/office/powerpoint/2010/main" val="3348220065"/>
       </p:ext>
     </p:extLst>
   </p:cSld>
@@ -961,7 +961,7 @@
           <p:cNvPr id="2" name="Title 1">
             <a:extLst>
               <a:ext uri="{FF2B5EF4-FFF2-40B4-BE49-F238E27FC236}">
-                <a16:creationId xmlns:a16="http://schemas.microsoft.com/office/drawing/2014/main" id="{417A2AF4-2088-8A3C-1CAA-A6BA2317B38D}"/>
+                <a16:creationId xmlns:a16="http://schemas.microsoft.com/office/drawing/2014/main" id="{20B3736A-67F0-A2C2-4BE7-027F8E1C3A4F}"/>
               </a:ext>
             </a:extLst>
           </p:cNvPr>
@@ -999,7 +999,7 @@
           <p:cNvPr id="3" name="Text Placeholder 2">
             <a:extLst>
               <a:ext uri="{FF2B5EF4-FFF2-40B4-BE49-F238E27FC236}">
-                <a16:creationId xmlns:a16="http://schemas.microsoft.com/office/drawing/2014/main" id="{DC91DE8D-0B8D-336C-634F-DF5BF14FDF06}"/>
+                <a16:creationId xmlns:a16="http://schemas.microsoft.com/office/drawing/2014/main" id="{BD716907-37A8-1558-7E02-FF55B2685DAA}"/>
               </a:ext>
             </a:extLst>
           </p:cNvPr>
@@ -1124,7 +1124,7 @@
           <p:cNvPr id="4" name="Date Placeholder 3">
             <a:extLst>
               <a:ext uri="{FF2B5EF4-FFF2-40B4-BE49-F238E27FC236}">
-                <a16:creationId xmlns:a16="http://schemas.microsoft.com/office/drawing/2014/main" id="{0269768D-8102-52E7-E285-EA5FF1325AE4}"/>
+                <a16:creationId xmlns:a16="http://schemas.microsoft.com/office/drawing/2014/main" id="{DA9B272C-0100-1096-9A31-D71DDE9D0199}"/>
               </a:ext>
             </a:extLst>
           </p:cNvPr>
@@ -1140,7 +1140,7 @@
           <a:bodyPr/>
           <a:lstStyle/>
           <a:p>
-            <a:fld id="{CD6DCCC6-BADD-41C4-B4B0-955E0C7C8049}" type="datetimeFigureOut">
+            <a:fld id="{F550F806-175B-4EE1-ABEA-A5F04E4FD72B}" type="datetimeFigureOut">
               <a:rPr lang="pl-PL" smtClean="0"/>
               <a:t>20.08.2025</a:t>
             </a:fld>
@@ -1153,7 +1153,7 @@
           <p:cNvPr id="5" name="Footer Placeholder 4">
             <a:extLst>
               <a:ext uri="{FF2B5EF4-FFF2-40B4-BE49-F238E27FC236}">
-                <a16:creationId xmlns:a16="http://schemas.microsoft.com/office/drawing/2014/main" id="{13AB3595-8E8B-35DC-2945-36D281E2ED7F}"/>
+                <a16:creationId xmlns:a16="http://schemas.microsoft.com/office/drawing/2014/main" id="{BDF9B897-809A-1719-4648-49B84910DBB9}"/>
               </a:ext>
             </a:extLst>
           </p:cNvPr>
@@ -1178,7 +1178,7 @@
           <p:cNvPr id="6" name="Slide Number Placeholder 5">
             <a:extLst>
               <a:ext uri="{FF2B5EF4-FFF2-40B4-BE49-F238E27FC236}">
-                <a16:creationId xmlns:a16="http://schemas.microsoft.com/office/drawing/2014/main" id="{870FCF0F-A91B-2EE3-D8C1-17B3FD1C7F3D}"/>
+                <a16:creationId xmlns:a16="http://schemas.microsoft.com/office/drawing/2014/main" id="{0ACB2D60-068F-1150-CDE9-4511C6EB7EE4}"/>
               </a:ext>
             </a:extLst>
           </p:cNvPr>
@@ -1194,7 +1194,7 @@
           <a:bodyPr/>
           <a:lstStyle/>
           <a:p>
-            <a:fld id="{CCBC8787-89D9-48E3-8596-2CADE2E7DDE1}" type="slidenum">
+            <a:fld id="{5FAB34AF-B09A-4E2A-BAD3-CCD6E0AD81E6}" type="slidenum">
               <a:rPr lang="pl-PL" smtClean="0"/>
               <a:t>‹#›</a:t>
             </a:fld>
@@ -1205,7 +1205,7 @@
     </p:spTree>
     <p:extLst>
       <p:ext uri="{BB962C8B-B14F-4D97-AF65-F5344CB8AC3E}">
-        <p14:creationId xmlns:p14="http://schemas.microsoft.com/office/powerpoint/2010/main" val="3301076367"/>
+        <p14:creationId xmlns:p14="http://schemas.microsoft.com/office/powerpoint/2010/main" val="2796734012"/>
       </p:ext>
     </p:extLst>
   </p:cSld>
@@ -1237,7 +1237,7 @@
           <p:cNvPr id="2" name="Title 1">
             <a:extLst>
               <a:ext uri="{FF2B5EF4-FFF2-40B4-BE49-F238E27FC236}">
-                <a16:creationId xmlns:a16="http://schemas.microsoft.com/office/drawing/2014/main" id="{D0A92BB0-9E2A-721F-B283-3F5633827FAB}"/>
+                <a16:creationId xmlns:a16="http://schemas.microsoft.com/office/drawing/2014/main" id="{9A9CDBE5-DE92-8A26-67BE-A69E03B1489B}"/>
               </a:ext>
             </a:extLst>
           </p:cNvPr>
@@ -1266,7 +1266,7 @@
           <p:cNvPr id="3" name="Content Placeholder 2">
             <a:extLst>
               <a:ext uri="{FF2B5EF4-FFF2-40B4-BE49-F238E27FC236}">
-                <a16:creationId xmlns:a16="http://schemas.microsoft.com/office/drawing/2014/main" id="{749CB2E6-2943-EA94-04DE-237D1CE7549D}"/>
+                <a16:creationId xmlns:a16="http://schemas.microsoft.com/office/drawing/2014/main" id="{06033BBF-FAA9-D126-F725-8C12C150DF8B}"/>
               </a:ext>
             </a:extLst>
           </p:cNvPr>
@@ -1329,7 +1329,7 @@
           <p:cNvPr id="4" name="Content Placeholder 3">
             <a:extLst>
               <a:ext uri="{FF2B5EF4-FFF2-40B4-BE49-F238E27FC236}">
-                <a16:creationId xmlns:a16="http://schemas.microsoft.com/office/drawing/2014/main" id="{162469CA-B9C0-A89A-8F35-DC94A8C97791}"/>
+                <a16:creationId xmlns:a16="http://schemas.microsoft.com/office/drawing/2014/main" id="{7E2C3E91-5DA8-469B-3502-73BAEF25F66B}"/>
               </a:ext>
             </a:extLst>
           </p:cNvPr>
@@ -1392,7 +1392,7 @@
           <p:cNvPr id="5" name="Date Placeholder 4">
             <a:extLst>
               <a:ext uri="{FF2B5EF4-FFF2-40B4-BE49-F238E27FC236}">
-                <a16:creationId xmlns:a16="http://schemas.microsoft.com/office/drawing/2014/main" id="{401632C3-E529-BC97-3266-2D812700142C}"/>
+                <a16:creationId xmlns:a16="http://schemas.microsoft.com/office/drawing/2014/main" id="{0C843B07-892D-AEFC-B9EA-F29956C9BA74}"/>
               </a:ext>
             </a:extLst>
           </p:cNvPr>
@@ -1408,7 +1408,7 @@
           <a:bodyPr/>
           <a:lstStyle/>
           <a:p>
-            <a:fld id="{CD6DCCC6-BADD-41C4-B4B0-955E0C7C8049}" type="datetimeFigureOut">
+            <a:fld id="{F550F806-175B-4EE1-ABEA-A5F04E4FD72B}" type="datetimeFigureOut">
               <a:rPr lang="pl-PL" smtClean="0"/>
               <a:t>20.08.2025</a:t>
             </a:fld>
@@ -1421,7 +1421,7 @@
           <p:cNvPr id="6" name="Footer Placeholder 5">
             <a:extLst>
               <a:ext uri="{FF2B5EF4-FFF2-40B4-BE49-F238E27FC236}">
-                <a16:creationId xmlns:a16="http://schemas.microsoft.com/office/drawing/2014/main" id="{5F4865A2-EF8C-1367-0A3A-DAB54A19DDAB}"/>
+                <a16:creationId xmlns:a16="http://schemas.microsoft.com/office/drawing/2014/main" id="{5467C875-9421-F4B6-3E20-46E856A91BE5}"/>
               </a:ext>
             </a:extLst>
           </p:cNvPr>
@@ -1446,7 +1446,7 @@
           <p:cNvPr id="7" name="Slide Number Placeholder 6">
             <a:extLst>
               <a:ext uri="{FF2B5EF4-FFF2-40B4-BE49-F238E27FC236}">
-                <a16:creationId xmlns:a16="http://schemas.microsoft.com/office/drawing/2014/main" id="{C058EEC6-3547-D40F-5B9C-778969E51218}"/>
+                <a16:creationId xmlns:a16="http://schemas.microsoft.com/office/drawing/2014/main" id="{81FA18BB-203B-F167-F27A-FE902142A696}"/>
               </a:ext>
             </a:extLst>
           </p:cNvPr>
@@ -1462,7 +1462,7 @@
           <a:bodyPr/>
           <a:lstStyle/>
           <a:p>
-            <a:fld id="{CCBC8787-89D9-48E3-8596-2CADE2E7DDE1}" type="slidenum">
+            <a:fld id="{5FAB34AF-B09A-4E2A-BAD3-CCD6E0AD81E6}" type="slidenum">
               <a:rPr lang="pl-PL" smtClean="0"/>
               <a:t>‹#›</a:t>
             </a:fld>
@@ -1473,7 +1473,7 @@
     </p:spTree>
     <p:extLst>
       <p:ext uri="{BB962C8B-B14F-4D97-AF65-F5344CB8AC3E}">
-        <p14:creationId xmlns:p14="http://schemas.microsoft.com/office/powerpoint/2010/main" val="254681797"/>
+        <p14:creationId xmlns:p14="http://schemas.microsoft.com/office/powerpoint/2010/main" val="3105625174"/>
       </p:ext>
     </p:extLst>
   </p:cSld>
@@ -1505,7 +1505,7 @@
           <p:cNvPr id="2" name="Title 1">
             <a:extLst>
               <a:ext uri="{FF2B5EF4-FFF2-40B4-BE49-F238E27FC236}">
-                <a16:creationId xmlns:a16="http://schemas.microsoft.com/office/drawing/2014/main" id="{6004A013-E1B8-AA66-6161-453CB5DDAD80}"/>
+                <a16:creationId xmlns:a16="http://schemas.microsoft.com/office/drawing/2014/main" id="{CE6BB028-2054-749C-C942-F73C96BE24F4}"/>
               </a:ext>
             </a:extLst>
           </p:cNvPr>
@@ -1539,7 +1539,7 @@
           <p:cNvPr id="3" name="Text Placeholder 2">
             <a:extLst>
               <a:ext uri="{FF2B5EF4-FFF2-40B4-BE49-F238E27FC236}">
-                <a16:creationId xmlns:a16="http://schemas.microsoft.com/office/drawing/2014/main" id="{9BAE3EE3-D7B6-BC0C-1FDF-7814CDD66C57}"/>
+                <a16:creationId xmlns:a16="http://schemas.microsoft.com/office/drawing/2014/main" id="{74DEF3B3-0DC9-70DC-904F-4C1D2B2AB2A5}"/>
               </a:ext>
             </a:extLst>
           </p:cNvPr>
@@ -1610,7 +1610,7 @@
           <p:cNvPr id="4" name="Content Placeholder 3">
             <a:extLst>
               <a:ext uri="{FF2B5EF4-FFF2-40B4-BE49-F238E27FC236}">
-                <a16:creationId xmlns:a16="http://schemas.microsoft.com/office/drawing/2014/main" id="{9F5B0FDD-3956-2CD1-23B9-6CE7D84F042F}"/>
+                <a16:creationId xmlns:a16="http://schemas.microsoft.com/office/drawing/2014/main" id="{1D4F686E-CE94-9E71-7BF2-9C9A7E7C3127}"/>
               </a:ext>
             </a:extLst>
           </p:cNvPr>
@@ -1673,7 +1673,7 @@
           <p:cNvPr id="5" name="Text Placeholder 4">
             <a:extLst>
               <a:ext uri="{FF2B5EF4-FFF2-40B4-BE49-F238E27FC236}">
-                <a16:creationId xmlns:a16="http://schemas.microsoft.com/office/drawing/2014/main" id="{0CAC3B2E-BB8F-D68E-FBBA-6911CB6BDC5C}"/>
+                <a16:creationId xmlns:a16="http://schemas.microsoft.com/office/drawing/2014/main" id="{B619D884-F64E-9FFE-8448-FF3CBC5A74DF}"/>
               </a:ext>
             </a:extLst>
           </p:cNvPr>
@@ -1744,7 +1744,7 @@
           <p:cNvPr id="6" name="Content Placeholder 5">
             <a:extLst>
               <a:ext uri="{FF2B5EF4-FFF2-40B4-BE49-F238E27FC236}">
-                <a16:creationId xmlns:a16="http://schemas.microsoft.com/office/drawing/2014/main" id="{0F8173C0-172E-BA59-62D6-05D26EB68F34}"/>
+                <a16:creationId xmlns:a16="http://schemas.microsoft.com/office/drawing/2014/main" id="{106F62F3-7471-62F6-2CB2-66DEA739A900}"/>
               </a:ext>
             </a:extLst>
           </p:cNvPr>
@@ -1807,7 +1807,7 @@
           <p:cNvPr id="7" name="Date Placeholder 6">
             <a:extLst>
               <a:ext uri="{FF2B5EF4-FFF2-40B4-BE49-F238E27FC236}">
-                <a16:creationId xmlns:a16="http://schemas.microsoft.com/office/drawing/2014/main" id="{A068DF92-EC03-3FC2-CB22-0FD776C28899}"/>
+                <a16:creationId xmlns:a16="http://schemas.microsoft.com/office/drawing/2014/main" id="{1019A1BA-DAE9-001F-4C1C-ED08C6A81764}"/>
               </a:ext>
             </a:extLst>
           </p:cNvPr>
@@ -1823,7 +1823,7 @@
           <a:bodyPr/>
           <a:lstStyle/>
           <a:p>
-            <a:fld id="{CD6DCCC6-BADD-41C4-B4B0-955E0C7C8049}" type="datetimeFigureOut">
+            <a:fld id="{F550F806-175B-4EE1-ABEA-A5F04E4FD72B}" type="datetimeFigureOut">
               <a:rPr lang="pl-PL" smtClean="0"/>
               <a:t>20.08.2025</a:t>
             </a:fld>
@@ -1836,7 +1836,7 @@
           <p:cNvPr id="8" name="Footer Placeholder 7">
             <a:extLst>
               <a:ext uri="{FF2B5EF4-FFF2-40B4-BE49-F238E27FC236}">
-                <a16:creationId xmlns:a16="http://schemas.microsoft.com/office/drawing/2014/main" id="{F9DE74BD-907B-CB52-6BE3-FF6FDDD2E7D5}"/>
+                <a16:creationId xmlns:a16="http://schemas.microsoft.com/office/drawing/2014/main" id="{BF929D73-CB7B-6744-136E-F33DB5F0904C}"/>
               </a:ext>
             </a:extLst>
           </p:cNvPr>
@@ -1861,7 +1861,7 @@
           <p:cNvPr id="9" name="Slide Number Placeholder 8">
             <a:extLst>
               <a:ext uri="{FF2B5EF4-FFF2-40B4-BE49-F238E27FC236}">
-                <a16:creationId xmlns:a16="http://schemas.microsoft.com/office/drawing/2014/main" id="{16EE8141-5CEA-7782-C4B4-E69B0090CEBF}"/>
+                <a16:creationId xmlns:a16="http://schemas.microsoft.com/office/drawing/2014/main" id="{33497FF4-3C24-DC06-5760-1ECE11A8B3CB}"/>
               </a:ext>
             </a:extLst>
           </p:cNvPr>
@@ -1877,7 +1877,7 @@
           <a:bodyPr/>
           <a:lstStyle/>
           <a:p>
-            <a:fld id="{CCBC8787-89D9-48E3-8596-2CADE2E7DDE1}" type="slidenum">
+            <a:fld id="{5FAB34AF-B09A-4E2A-BAD3-CCD6E0AD81E6}" type="slidenum">
               <a:rPr lang="pl-PL" smtClean="0"/>
               <a:t>‹#›</a:t>
             </a:fld>
@@ -1888,7 +1888,7 @@
     </p:spTree>
     <p:extLst>
       <p:ext uri="{BB962C8B-B14F-4D97-AF65-F5344CB8AC3E}">
-        <p14:creationId xmlns:p14="http://schemas.microsoft.com/office/powerpoint/2010/main" val="919756384"/>
+        <p14:creationId xmlns:p14="http://schemas.microsoft.com/office/powerpoint/2010/main" val="1479905673"/>
       </p:ext>
     </p:extLst>
   </p:cSld>
@@ -1920,7 +1920,7 @@
           <p:cNvPr id="2" name="Title 1">
             <a:extLst>
               <a:ext uri="{FF2B5EF4-FFF2-40B4-BE49-F238E27FC236}">
-                <a16:creationId xmlns:a16="http://schemas.microsoft.com/office/drawing/2014/main" id="{39A2E84D-90BC-192A-EE51-2597B7B58E9B}"/>
+                <a16:creationId xmlns:a16="http://schemas.microsoft.com/office/drawing/2014/main" id="{FCA93AF8-F93E-99FA-0D8E-C9A46013178E}"/>
               </a:ext>
             </a:extLst>
           </p:cNvPr>
@@ -1949,7 +1949,7 @@
           <p:cNvPr id="3" name="Date Placeholder 2">
             <a:extLst>
               <a:ext uri="{FF2B5EF4-FFF2-40B4-BE49-F238E27FC236}">
-                <a16:creationId xmlns:a16="http://schemas.microsoft.com/office/drawing/2014/main" id="{A1315878-CDE6-A6B1-A799-FE5B3310DF36}"/>
+                <a16:creationId xmlns:a16="http://schemas.microsoft.com/office/drawing/2014/main" id="{A37AE221-4003-4E40-3C7E-FA7E63D4E399}"/>
               </a:ext>
             </a:extLst>
           </p:cNvPr>
@@ -1965,7 +1965,7 @@
           <a:bodyPr/>
           <a:lstStyle/>
           <a:p>
-            <a:fld id="{CD6DCCC6-BADD-41C4-B4B0-955E0C7C8049}" type="datetimeFigureOut">
+            <a:fld id="{F550F806-175B-4EE1-ABEA-A5F04E4FD72B}" type="datetimeFigureOut">
               <a:rPr lang="pl-PL" smtClean="0"/>
               <a:t>20.08.2025</a:t>
             </a:fld>
@@ -1978,7 +1978,7 @@
           <p:cNvPr id="4" name="Footer Placeholder 3">
             <a:extLst>
               <a:ext uri="{FF2B5EF4-FFF2-40B4-BE49-F238E27FC236}">
-                <a16:creationId xmlns:a16="http://schemas.microsoft.com/office/drawing/2014/main" id="{B8FC06A8-3737-B689-28A1-9218C68BFEA6}"/>
+                <a16:creationId xmlns:a16="http://schemas.microsoft.com/office/drawing/2014/main" id="{AB5DA4FE-36DC-6B9B-2ACC-05D1ABFFBB53}"/>
               </a:ext>
             </a:extLst>
           </p:cNvPr>
@@ -2003,7 +2003,7 @@
           <p:cNvPr id="5" name="Slide Number Placeholder 4">
             <a:extLst>
               <a:ext uri="{FF2B5EF4-FFF2-40B4-BE49-F238E27FC236}">
-                <a16:creationId xmlns:a16="http://schemas.microsoft.com/office/drawing/2014/main" id="{995EE138-4FBE-66CB-03BC-A2C424D3514E}"/>
+                <a16:creationId xmlns:a16="http://schemas.microsoft.com/office/drawing/2014/main" id="{32A33B40-1DBB-ECA9-F2C0-335BA10A18CA}"/>
               </a:ext>
             </a:extLst>
           </p:cNvPr>
@@ -2019,7 +2019,7 @@
           <a:bodyPr/>
           <a:lstStyle/>
           <a:p>
-            <a:fld id="{CCBC8787-89D9-48E3-8596-2CADE2E7DDE1}" type="slidenum">
+            <a:fld id="{5FAB34AF-B09A-4E2A-BAD3-CCD6E0AD81E6}" type="slidenum">
               <a:rPr lang="pl-PL" smtClean="0"/>
               <a:t>‹#›</a:t>
             </a:fld>
@@ -2030,7 +2030,7 @@
     </p:spTree>
     <p:extLst>
       <p:ext uri="{BB962C8B-B14F-4D97-AF65-F5344CB8AC3E}">
-        <p14:creationId xmlns:p14="http://schemas.microsoft.com/office/powerpoint/2010/main" val="1672718207"/>
+        <p14:creationId xmlns:p14="http://schemas.microsoft.com/office/powerpoint/2010/main" val="246031094"/>
       </p:ext>
     </p:extLst>
   </p:cSld>
@@ -2062,7 +2062,7 @@
           <p:cNvPr id="2" name="Date Placeholder 1">
             <a:extLst>
               <a:ext uri="{FF2B5EF4-FFF2-40B4-BE49-F238E27FC236}">
-                <a16:creationId xmlns:a16="http://schemas.microsoft.com/office/drawing/2014/main" id="{F19C2900-30CB-3C96-BB10-DC94F7C8D09C}"/>
+                <a16:creationId xmlns:a16="http://schemas.microsoft.com/office/drawing/2014/main" id="{37685DD7-06D2-0546-70AA-9C13AB9DB767}"/>
               </a:ext>
             </a:extLst>
           </p:cNvPr>
@@ -2078,7 +2078,7 @@
           <a:bodyPr/>
           <a:lstStyle/>
           <a:p>
-            <a:fld id="{CD6DCCC6-BADD-41C4-B4B0-955E0C7C8049}" type="datetimeFigureOut">
+            <a:fld id="{F550F806-175B-4EE1-ABEA-A5F04E4FD72B}" type="datetimeFigureOut">
               <a:rPr lang="pl-PL" smtClean="0"/>
               <a:t>20.08.2025</a:t>
             </a:fld>
@@ -2091,7 +2091,7 @@
           <p:cNvPr id="3" name="Footer Placeholder 2">
             <a:extLst>
               <a:ext uri="{FF2B5EF4-FFF2-40B4-BE49-F238E27FC236}">
-                <a16:creationId xmlns:a16="http://schemas.microsoft.com/office/drawing/2014/main" id="{10931490-C3DC-C0A2-BFDC-28535669BD74}"/>
+                <a16:creationId xmlns:a16="http://schemas.microsoft.com/office/drawing/2014/main" id="{4C010C04-55EC-89FE-7B95-CABF324B14FA}"/>
               </a:ext>
             </a:extLst>
           </p:cNvPr>
@@ -2116,7 +2116,7 @@
           <p:cNvPr id="4" name="Slide Number Placeholder 3">
             <a:extLst>
               <a:ext uri="{FF2B5EF4-FFF2-40B4-BE49-F238E27FC236}">
-                <a16:creationId xmlns:a16="http://schemas.microsoft.com/office/drawing/2014/main" id="{7CCA9D4A-F0E2-B855-44D4-824B9D6ED67D}"/>
+                <a16:creationId xmlns:a16="http://schemas.microsoft.com/office/drawing/2014/main" id="{336B4F7D-A020-7502-696D-F5F9D466B74B}"/>
               </a:ext>
             </a:extLst>
           </p:cNvPr>
@@ -2132,7 +2132,7 @@
           <a:bodyPr/>
           <a:lstStyle/>
           <a:p>
-            <a:fld id="{CCBC8787-89D9-48E3-8596-2CADE2E7DDE1}" type="slidenum">
+            <a:fld id="{5FAB34AF-B09A-4E2A-BAD3-CCD6E0AD81E6}" type="slidenum">
               <a:rPr lang="pl-PL" smtClean="0"/>
               <a:t>‹#›</a:t>
             </a:fld>
@@ -2143,7 +2143,7 @@
     </p:spTree>
     <p:extLst>
       <p:ext uri="{BB962C8B-B14F-4D97-AF65-F5344CB8AC3E}">
-        <p14:creationId xmlns:p14="http://schemas.microsoft.com/office/powerpoint/2010/main" val="3469923562"/>
+        <p14:creationId xmlns:p14="http://schemas.microsoft.com/office/powerpoint/2010/main" val="1065518391"/>
       </p:ext>
     </p:extLst>
   </p:cSld>
@@ -2175,7 +2175,7 @@
           <p:cNvPr id="2" name="Title 1">
             <a:extLst>
               <a:ext uri="{FF2B5EF4-FFF2-40B4-BE49-F238E27FC236}">
-                <a16:creationId xmlns:a16="http://schemas.microsoft.com/office/drawing/2014/main" id="{8EF0263C-2E90-0E3F-18C7-4B571FC83C07}"/>
+                <a16:creationId xmlns:a16="http://schemas.microsoft.com/office/drawing/2014/main" id="{7A7110A2-DD46-EC0D-EB4A-D04827AFE4E6}"/>
               </a:ext>
             </a:extLst>
           </p:cNvPr>
@@ -2213,7 +2213,7 @@
           <p:cNvPr id="3" name="Content Placeholder 2">
             <a:extLst>
               <a:ext uri="{FF2B5EF4-FFF2-40B4-BE49-F238E27FC236}">
-                <a16:creationId xmlns:a16="http://schemas.microsoft.com/office/drawing/2014/main" id="{0DD85498-A0D1-97ED-D9F3-143D00E0376F}"/>
+                <a16:creationId xmlns:a16="http://schemas.microsoft.com/office/drawing/2014/main" id="{299F80EA-C924-167B-61DF-001B20C95D2D}"/>
               </a:ext>
             </a:extLst>
           </p:cNvPr>
@@ -2304,7 +2304,7 @@
           <p:cNvPr id="4" name="Text Placeholder 3">
             <a:extLst>
               <a:ext uri="{FF2B5EF4-FFF2-40B4-BE49-F238E27FC236}">
-                <a16:creationId xmlns:a16="http://schemas.microsoft.com/office/drawing/2014/main" id="{7B7805A0-73D0-68E2-AF20-F90CB25FC87E}"/>
+                <a16:creationId xmlns:a16="http://schemas.microsoft.com/office/drawing/2014/main" id="{7FBAFD28-36D8-1D95-ECE1-29F9F0C63AB2}"/>
               </a:ext>
             </a:extLst>
           </p:cNvPr>
@@ -2375,7 +2375,7 @@
           <p:cNvPr id="5" name="Date Placeholder 4">
             <a:extLst>
               <a:ext uri="{FF2B5EF4-FFF2-40B4-BE49-F238E27FC236}">
-                <a16:creationId xmlns:a16="http://schemas.microsoft.com/office/drawing/2014/main" id="{86D500E2-2B99-8D0E-BD04-C3AB559C0768}"/>
+                <a16:creationId xmlns:a16="http://schemas.microsoft.com/office/drawing/2014/main" id="{DA58A854-C3C3-B609-1170-9A53519F91FE}"/>
               </a:ext>
             </a:extLst>
           </p:cNvPr>
@@ -2391,7 +2391,7 @@
           <a:bodyPr/>
           <a:lstStyle/>
           <a:p>
-            <a:fld id="{CD6DCCC6-BADD-41C4-B4B0-955E0C7C8049}" type="datetimeFigureOut">
+            <a:fld id="{F550F806-175B-4EE1-ABEA-A5F04E4FD72B}" type="datetimeFigureOut">
               <a:rPr lang="pl-PL" smtClean="0"/>
               <a:t>20.08.2025</a:t>
             </a:fld>
@@ -2404,7 +2404,7 @@
           <p:cNvPr id="6" name="Footer Placeholder 5">
             <a:extLst>
               <a:ext uri="{FF2B5EF4-FFF2-40B4-BE49-F238E27FC236}">
-                <a16:creationId xmlns:a16="http://schemas.microsoft.com/office/drawing/2014/main" id="{D1F267A6-0A15-3D79-D34A-3FC8DAEAB3DC}"/>
+                <a16:creationId xmlns:a16="http://schemas.microsoft.com/office/drawing/2014/main" id="{77FDADC3-A993-FDB8-75A7-428B989CCE6B}"/>
               </a:ext>
             </a:extLst>
           </p:cNvPr>
@@ -2429,7 +2429,7 @@
           <p:cNvPr id="7" name="Slide Number Placeholder 6">
             <a:extLst>
               <a:ext uri="{FF2B5EF4-FFF2-40B4-BE49-F238E27FC236}">
-                <a16:creationId xmlns:a16="http://schemas.microsoft.com/office/drawing/2014/main" id="{2D26BF4C-F815-EFF8-674C-6994CF6E3F05}"/>
+                <a16:creationId xmlns:a16="http://schemas.microsoft.com/office/drawing/2014/main" id="{C234B184-4DCC-07B8-3FFF-B051A5A3BBC2}"/>
               </a:ext>
             </a:extLst>
           </p:cNvPr>
@@ -2445,7 +2445,7 @@
           <a:bodyPr/>
           <a:lstStyle/>
           <a:p>
-            <a:fld id="{CCBC8787-89D9-48E3-8596-2CADE2E7DDE1}" type="slidenum">
+            <a:fld id="{5FAB34AF-B09A-4E2A-BAD3-CCD6E0AD81E6}" type="slidenum">
               <a:rPr lang="pl-PL" smtClean="0"/>
               <a:t>‹#›</a:t>
             </a:fld>
@@ -2456,7 +2456,7 @@
     </p:spTree>
     <p:extLst>
       <p:ext uri="{BB962C8B-B14F-4D97-AF65-F5344CB8AC3E}">
-        <p14:creationId xmlns:p14="http://schemas.microsoft.com/office/powerpoint/2010/main" val="1527939800"/>
+        <p14:creationId xmlns:p14="http://schemas.microsoft.com/office/powerpoint/2010/main" val="2228906514"/>
       </p:ext>
     </p:extLst>
   </p:cSld>
@@ -2488,7 +2488,7 @@
           <p:cNvPr id="2" name="Title 1">
             <a:extLst>
               <a:ext uri="{FF2B5EF4-FFF2-40B4-BE49-F238E27FC236}">
-                <a16:creationId xmlns:a16="http://schemas.microsoft.com/office/drawing/2014/main" id="{0E476585-0A62-D17E-690D-7A931645B278}"/>
+                <a16:creationId xmlns:a16="http://schemas.microsoft.com/office/drawing/2014/main" id="{E1CF4EB0-B301-DC9E-B2C5-E1905AB20F7B}"/>
               </a:ext>
             </a:extLst>
           </p:cNvPr>
@@ -2526,7 +2526,7 @@
           <p:cNvPr id="3" name="Picture Placeholder 2">
             <a:extLst>
               <a:ext uri="{FF2B5EF4-FFF2-40B4-BE49-F238E27FC236}">
-                <a16:creationId xmlns:a16="http://schemas.microsoft.com/office/drawing/2014/main" id="{46210B60-D347-50C4-02A5-9467439E5994}"/>
+                <a16:creationId xmlns:a16="http://schemas.microsoft.com/office/drawing/2014/main" id="{B1B062AF-5584-FBDA-0968-08234852218C}"/>
               </a:ext>
             </a:extLst>
           </p:cNvPr>
@@ -2593,7 +2593,7 @@
           <p:cNvPr id="4" name="Text Placeholder 3">
             <a:extLst>
               <a:ext uri="{FF2B5EF4-FFF2-40B4-BE49-F238E27FC236}">
-                <a16:creationId xmlns:a16="http://schemas.microsoft.com/office/drawing/2014/main" id="{702B6EE7-995D-3AD2-F158-1C6C2DD1FB9D}"/>
+                <a16:creationId xmlns:a16="http://schemas.microsoft.com/office/drawing/2014/main" id="{FF457D08-F650-24DF-05DF-841A9C5BBCB5}"/>
               </a:ext>
             </a:extLst>
           </p:cNvPr>
@@ -2664,7 +2664,7 @@
           <p:cNvPr id="5" name="Date Placeholder 4">
             <a:extLst>
               <a:ext uri="{FF2B5EF4-FFF2-40B4-BE49-F238E27FC236}">
-                <a16:creationId xmlns:a16="http://schemas.microsoft.com/office/drawing/2014/main" id="{EEEEBEB2-46B8-5A60-972B-ACB624469E82}"/>
+                <a16:creationId xmlns:a16="http://schemas.microsoft.com/office/drawing/2014/main" id="{F7656F4A-A937-7B2E-F7A2-3B946B3073B4}"/>
               </a:ext>
             </a:extLst>
           </p:cNvPr>
@@ -2680,7 +2680,7 @@
           <a:bodyPr/>
           <a:lstStyle/>
           <a:p>
-            <a:fld id="{CD6DCCC6-BADD-41C4-B4B0-955E0C7C8049}" type="datetimeFigureOut">
+            <a:fld id="{F550F806-175B-4EE1-ABEA-A5F04E4FD72B}" type="datetimeFigureOut">
               <a:rPr lang="pl-PL" smtClean="0"/>
               <a:t>20.08.2025</a:t>
             </a:fld>
@@ -2693,7 +2693,7 @@
           <p:cNvPr id="6" name="Footer Placeholder 5">
             <a:extLst>
               <a:ext uri="{FF2B5EF4-FFF2-40B4-BE49-F238E27FC236}">
-                <a16:creationId xmlns:a16="http://schemas.microsoft.com/office/drawing/2014/main" id="{6A103D5A-CD5F-340E-2B99-141E02E854F4}"/>
+                <a16:creationId xmlns:a16="http://schemas.microsoft.com/office/drawing/2014/main" id="{09B9912F-47D6-CEA3-3B4E-F02FD11E3781}"/>
               </a:ext>
             </a:extLst>
           </p:cNvPr>
@@ -2718,7 +2718,7 @@
           <p:cNvPr id="7" name="Slide Number Placeholder 6">
             <a:extLst>
               <a:ext uri="{FF2B5EF4-FFF2-40B4-BE49-F238E27FC236}">
-                <a16:creationId xmlns:a16="http://schemas.microsoft.com/office/drawing/2014/main" id="{7B5FF742-ED2C-D46A-2385-7B59E0717462}"/>
+                <a16:creationId xmlns:a16="http://schemas.microsoft.com/office/drawing/2014/main" id="{610ED5CD-E0F0-7DAC-3A3D-6C8EE773E7EC}"/>
               </a:ext>
             </a:extLst>
           </p:cNvPr>
@@ -2734,7 +2734,7 @@
           <a:bodyPr/>
           <a:lstStyle/>
           <a:p>
-            <a:fld id="{CCBC8787-89D9-48E3-8596-2CADE2E7DDE1}" type="slidenum">
+            <a:fld id="{5FAB34AF-B09A-4E2A-BAD3-CCD6E0AD81E6}" type="slidenum">
               <a:rPr lang="pl-PL" smtClean="0"/>
               <a:t>‹#›</a:t>
             </a:fld>
@@ -2745,7 +2745,7 @@
     </p:spTree>
     <p:extLst>
       <p:ext uri="{BB962C8B-B14F-4D97-AF65-F5344CB8AC3E}">
-        <p14:creationId xmlns:p14="http://schemas.microsoft.com/office/powerpoint/2010/main" val="1175906418"/>
+        <p14:creationId xmlns:p14="http://schemas.microsoft.com/office/powerpoint/2010/main" val="4258389826"/>
       </p:ext>
     </p:extLst>
   </p:cSld>
@@ -2782,7 +2782,7 @@
           <p:cNvPr id="2" name="Title Placeholder 1">
             <a:extLst>
               <a:ext uri="{FF2B5EF4-FFF2-40B4-BE49-F238E27FC236}">
-                <a16:creationId xmlns:a16="http://schemas.microsoft.com/office/drawing/2014/main" id="{5D02C3F5-EE73-01B7-F18C-F43708206B74}"/>
+                <a16:creationId xmlns:a16="http://schemas.microsoft.com/office/drawing/2014/main" id="{BCAD55D7-8407-282B-E405-D84A21921CC1}"/>
               </a:ext>
             </a:extLst>
           </p:cNvPr>
@@ -2821,7 +2821,7 @@
           <p:cNvPr id="3" name="Text Placeholder 2">
             <a:extLst>
               <a:ext uri="{FF2B5EF4-FFF2-40B4-BE49-F238E27FC236}">
-                <a16:creationId xmlns:a16="http://schemas.microsoft.com/office/drawing/2014/main" id="{65799C94-3191-266F-B492-5AA09FC52051}"/>
+                <a16:creationId xmlns:a16="http://schemas.microsoft.com/office/drawing/2014/main" id="{49ED3347-F499-82C3-5008-A73716BFD37D}"/>
               </a:ext>
             </a:extLst>
           </p:cNvPr>
@@ -2889,7 +2889,7 @@
           <p:cNvPr id="4" name="Date Placeholder 3">
             <a:extLst>
               <a:ext uri="{FF2B5EF4-FFF2-40B4-BE49-F238E27FC236}">
-                <a16:creationId xmlns:a16="http://schemas.microsoft.com/office/drawing/2014/main" id="{5BAE0698-2C5A-2DC5-68C0-95DA44D25E95}"/>
+                <a16:creationId xmlns:a16="http://schemas.microsoft.com/office/drawing/2014/main" id="{A8DB335C-48AC-6D23-FB30-15C4C4E8BA4A}"/>
               </a:ext>
             </a:extLst>
           </p:cNvPr>
@@ -2923,7 +2923,7 @@
             </a:lvl1pPr>
           </a:lstStyle>
           <a:p>
-            <a:fld id="{CD6DCCC6-BADD-41C4-B4B0-955E0C7C8049}" type="datetimeFigureOut">
+            <a:fld id="{F550F806-175B-4EE1-ABEA-A5F04E4FD72B}" type="datetimeFigureOut">
               <a:rPr lang="pl-PL" smtClean="0"/>
               <a:t>20.08.2025</a:t>
             </a:fld>
@@ -2936,7 +2936,7 @@
           <p:cNvPr id="5" name="Footer Placeholder 4">
             <a:extLst>
               <a:ext uri="{FF2B5EF4-FFF2-40B4-BE49-F238E27FC236}">
-                <a16:creationId xmlns:a16="http://schemas.microsoft.com/office/drawing/2014/main" id="{48FBE69F-AA7F-87D7-AC40-42278A41D806}"/>
+                <a16:creationId xmlns:a16="http://schemas.microsoft.com/office/drawing/2014/main" id="{0C56C7F4-DD84-1E1B-905A-BBAA0C9C1594}"/>
               </a:ext>
             </a:extLst>
           </p:cNvPr>
@@ -2979,7 +2979,7 @@
           <p:cNvPr id="6" name="Slide Number Placeholder 5">
             <a:extLst>
               <a:ext uri="{FF2B5EF4-FFF2-40B4-BE49-F238E27FC236}">
-                <a16:creationId xmlns:a16="http://schemas.microsoft.com/office/drawing/2014/main" id="{07F6DDA6-7ACC-DCA3-5A84-1DE18D58E0E3}"/>
+                <a16:creationId xmlns:a16="http://schemas.microsoft.com/office/drawing/2014/main" id="{1302F1BB-FA87-A34F-2419-C6ACD0D29928}"/>
               </a:ext>
             </a:extLst>
           </p:cNvPr>
@@ -3013,7 +3013,7 @@
             </a:lvl1pPr>
           </a:lstStyle>
           <a:p>
-            <a:fld id="{CCBC8787-89D9-48E3-8596-2CADE2E7DDE1}" type="slidenum">
+            <a:fld id="{5FAB34AF-B09A-4E2A-BAD3-CCD6E0AD81E6}" type="slidenum">
               <a:rPr lang="pl-PL" smtClean="0"/>
               <a:t>‹#›</a:t>
             </a:fld>
@@ -3024,7 +3024,7 @@
     </p:spTree>
     <p:extLst>
       <p:ext uri="{BB962C8B-B14F-4D97-AF65-F5344CB8AC3E}">
-        <p14:creationId xmlns:p14="http://schemas.microsoft.com/office/powerpoint/2010/main" val="2326973069"/>
+        <p14:creationId xmlns:p14="http://schemas.microsoft.com/office/powerpoint/2010/main" val="1568487410"/>
       </p:ext>
     </p:extLst>
   </p:cSld>
@@ -3342,60 +3342,10 @@
           <a:chExt cx="0" cy="0"/>
         </a:xfrm>
       </p:grpSpPr>
-      <p:sp>
-        <p:nvSpPr>
-          <p:cNvPr id="2" name="Title 1">
-            <a:extLst>
-              <a:ext uri="{FF2B5EF4-FFF2-40B4-BE49-F238E27FC236}">
-                <a16:creationId xmlns:a16="http://schemas.microsoft.com/office/drawing/2014/main" id="{F3768484-6BDC-06AE-5847-E78385EEDB45}"/>
-              </a:ext>
-            </a:extLst>
-          </p:cNvPr>
-          <p:cNvSpPr>
-            <a:spLocks noGrp="1"/>
-          </p:cNvSpPr>
-          <p:nvPr>
-            <p:ph type="ctrTitle"/>
-          </p:nvPr>
-        </p:nvSpPr>
-        <p:spPr/>
-        <p:txBody>
-          <a:bodyPr/>
-          <a:lstStyle/>
-          <a:p>
-            <a:endParaRPr lang="pl-PL"/>
-          </a:p>
-        </p:txBody>
-      </p:sp>
-      <p:sp>
-        <p:nvSpPr>
-          <p:cNvPr id="3" name="Subtitle 2">
-            <a:extLst>
-              <a:ext uri="{FF2B5EF4-FFF2-40B4-BE49-F238E27FC236}">
-                <a16:creationId xmlns:a16="http://schemas.microsoft.com/office/drawing/2014/main" id="{427C2580-7B0A-E397-CB40-9B53E099449D}"/>
-              </a:ext>
-            </a:extLst>
-          </p:cNvPr>
-          <p:cNvSpPr>
-            <a:spLocks noGrp="1"/>
-          </p:cNvSpPr>
-          <p:nvPr>
-            <p:ph type="subTitle" idx="1"/>
-          </p:nvPr>
-        </p:nvSpPr>
-        <p:spPr/>
-        <p:txBody>
-          <a:bodyPr/>
-          <a:lstStyle/>
-          <a:p>
-            <a:endParaRPr lang="pl-PL"/>
-          </a:p>
-        </p:txBody>
-      </p:sp>
     </p:spTree>
     <p:extLst>
       <p:ext uri="{BB962C8B-B14F-4D97-AF65-F5344CB8AC3E}">
-        <p14:creationId xmlns:p14="http://schemas.microsoft.com/office/powerpoint/2010/main" val="1157007060"/>
+        <p14:creationId xmlns:p14="http://schemas.microsoft.com/office/powerpoint/2010/main" val="234584052"/>
       </p:ext>
     </p:extLst>
   </p:cSld>

</xml_diff>